<commit_message>
small changes to Week 8 materials
</commit_message>
<xml_diff>
--- a/Week 8 -- Multivariate models/Lab 8/Week 8 Lab -- multivariate models.pptx
+++ b/Week 8 -- Multivariate models/Lab 8/Week 8 Lab -- multivariate models.pptx
@@ -4492,11 +4492,7 @@
           <a:p>
             <a:r>
               <a:rPr lang="en-US" dirty="0" smtClean="0"/>
-              <a:t>Lab </a:t>
-            </a:r>
-            <a:r>
-              <a:rPr lang="en-US" dirty="0" smtClean="0"/>
-              <a:t>8:  Multivariate models</a:t>
+              <a:t>Lab 8:  Multivariate models</a:t>
             </a:r>
             <a:endParaRPr lang="en-US" dirty="0"/>
           </a:p>
@@ -4824,8 +4820,8 @@
           </a:p>
         </p:txBody>
       </p:sp>
-      <mc:AlternateContent xmlns:mc="http://schemas.openxmlformats.org/markup-compatibility/2006">
-        <mc:Choice xmlns:a14="http://schemas.microsoft.com/office/drawing/2010/main" Requires="a14">
+      <mc:AlternateContent xmlns:mc="http://schemas.openxmlformats.org/markup-compatibility/2006" xmlns:a14="http://schemas.microsoft.com/office/drawing/2010/main">
+        <mc:Choice Requires="a14">
           <p:sp>
             <p:nvSpPr>
               <p:cNvPr id="6" name="Content Placeholder 5"/>
@@ -4857,11 +4853,7 @@
               <a:p>
                 <a:r>
                   <a:rPr lang="en-US" sz="2400" dirty="0" smtClean="0"/>
-                  <a:t>Analytic estimates provide confidence </a:t>
-                </a:r>
-                <a:r>
-                  <a:rPr lang="en-US" sz="2400" dirty="0" smtClean="0"/>
-                  <a:t>intervals</a:t>
+                  <a:t>Analytic estimates provide confidence intervals</a:t>
                 </a:r>
               </a:p>
               <a:p>
@@ -4937,7 +4929,7 @@
             </p:txBody>
           </p:sp>
         </mc:Choice>
-        <mc:Fallback>
+        <mc:Fallback xmlns="">
           <p:sp>
             <p:nvSpPr>
               <p:cNvPr id="6" name="Content Placeholder 5"/>
@@ -5796,7 +5788,6 @@
               <a:rPr lang="en-GB" sz="2000" dirty="0"/>
               <a:t>. Sci. 60, 542–552. doi:10.1139/f03-030</a:t>
             </a:r>
-            <a:endParaRPr lang="en-GB" sz="2000" dirty="0"/>
           </a:p>
         </p:txBody>
       </p:sp>
@@ -6596,8 +6587,9 @@
                               <m:r>
                                 <a:rPr lang="en-US" i="1">
                                   <a:latin typeface="Cambria Math"/>
+                                  <a:ea typeface="Cambria Math"/>
                                 </a:rPr>
-                                <m:t>𝑐</m:t>
+                                <m:t>𝜆</m:t>
                               </m:r>
                             </m:e>
                             <m:sub>
@@ -6650,8 +6642,9 @@
                               <m:r>
                                 <a:rPr lang="en-US" i="1">
                                   <a:latin typeface="Cambria Math"/>
+                                  <a:ea typeface="Cambria Math"/>
                                 </a:rPr>
-                                <m:t>𝑐</m:t>
+                                <m:t>𝜆</m:t>
                               </m:r>
                             </m:e>
                             <m:sub>
@@ -7086,11 +7079,35 @@
                     </m:oMathParaPr>
                     <m:oMath xmlns:m="http://schemas.openxmlformats.org/officeDocument/2006/math">
                       <m:r>
+                        <m:rPr>
+                          <m:sty m:val="p"/>
+                        </m:rPr>
+                        <a:rPr lang="en-US" b="0" i="0" smtClean="0">
+                          <a:latin typeface="Cambria Math" panose="02040503050406030204" pitchFamily="18" charset="0"/>
+                          <a:ea typeface="Cambria Math" panose="02040503050406030204" pitchFamily="18" charset="0"/>
+                        </a:rPr>
+                        <m:t>vec</m:t>
+                      </m:r>
+                      <m:r>
+                        <a:rPr lang="en-US" b="1" i="0" smtClean="0">
+                          <a:latin typeface="Cambria Math" panose="02040503050406030204" pitchFamily="18" charset="0"/>
+                          <a:ea typeface="Cambria Math" panose="02040503050406030204" pitchFamily="18" charset="0"/>
+                        </a:rPr>
+                        <m:t>(</m:t>
+                      </m:r>
+                      <m:r>
                         <a:rPr lang="el-GR" b="1" i="0" smtClean="0">
                           <a:latin typeface="Cambria Math" panose="02040503050406030204" pitchFamily="18" charset="0"/>
                           <a:ea typeface="Cambria Math" panose="02040503050406030204" pitchFamily="18" charset="0"/>
                         </a:rPr>
                         <m:t>𝛀</m:t>
+                      </m:r>
+                      <m:r>
+                        <a:rPr lang="en-US" b="0" i="1" smtClean="0">
+                          <a:latin typeface="Cambria Math" panose="02040503050406030204" pitchFamily="18" charset="0"/>
+                          <a:ea typeface="Cambria Math" panose="02040503050406030204" pitchFamily="18" charset="0"/>
+                        </a:rPr>
+                        <m:t>)</m:t>
                       </m:r>
                       <m:r>
                         <a:rPr lang="en-US" b="0" i="1" smtClean="0">
@@ -7181,8 +7198,13 @@
                 </a14:m>
                 <a:r>
                   <a:rPr lang="en-US" dirty="0" smtClean="0"/>
-                  <a:t> is spatial variation</a:t>
+                  <a:t> is spatial </a:t>
                 </a:r>
+                <a:r>
+                  <a:rPr lang="en-US" dirty="0" smtClean="0"/>
+                  <a:t>correlation matrix</a:t>
+                </a:r>
+                <a:endParaRPr lang="en-US" dirty="0" smtClean="0"/>
               </a:p>
               <a:p>
                 <a:pPr lvl="1"/>
@@ -7497,8 +7519,8 @@
           </a:p>
         </p:txBody>
       </p:sp>
-      <mc:AlternateContent xmlns:mc="http://schemas.openxmlformats.org/markup-compatibility/2006">
-        <mc:Choice xmlns:a14="http://schemas.microsoft.com/office/drawing/2010/main" Requires="a14">
+      <mc:AlternateContent xmlns:mc="http://schemas.openxmlformats.org/markup-compatibility/2006" xmlns:a14="http://schemas.microsoft.com/office/drawing/2010/main">
+        <mc:Choice Requires="a14">
           <p:sp>
             <p:nvSpPr>
               <p:cNvPr id="3" name="Content Placeholder 2"/>
@@ -8648,7 +8670,7 @@
             </p:txBody>
           </p:sp>
         </mc:Choice>
-        <mc:Fallback>
+        <mc:Fallback xmlns="">
           <p:sp>
             <p:nvSpPr>
               <p:cNvPr id="3" name="Content Placeholder 2"/>
@@ -8792,8 +8814,8 @@
           </a:p>
         </p:txBody>
       </p:sp>
-      <mc:AlternateContent xmlns:mc="http://schemas.openxmlformats.org/markup-compatibility/2006">
-        <mc:Choice xmlns:a14="http://schemas.microsoft.com/office/drawing/2010/main" Requires="a14">
+      <mc:AlternateContent xmlns:mc="http://schemas.openxmlformats.org/markup-compatibility/2006" xmlns:a14="http://schemas.microsoft.com/office/drawing/2010/main">
+        <mc:Choice Requires="a14">
           <p:sp>
             <p:nvSpPr>
               <p:cNvPr id="5" name="Content Placeholder 2"/>
@@ -9401,7 +9423,6 @@
                   <a:rPr lang="en-US" sz="2200" dirty="0" smtClean="0"/>
                   <a:t>Where:</a:t>
                 </a:r>
-                <a:endParaRPr lang="en-US" sz="2200" dirty="0" smtClean="0"/>
               </a:p>
               <a:p>
                 <a:pPr marL="0" indent="0">
@@ -9645,7 +9666,7 @@
             </p:txBody>
           </p:sp>
         </mc:Choice>
-        <mc:Fallback>
+        <mc:Fallback xmlns="">
           <p:sp>
             <p:nvSpPr>
               <p:cNvPr id="5" name="Content Placeholder 2"/>
@@ -9856,11 +9877,6 @@
               </a:rPr>
               <a:t>Low density</a:t>
             </a:r>
-            <a:endParaRPr lang="en-US" sz="2000" b="1" dirty="0">
-              <a:solidFill>
-                <a:srgbClr val="0070C0"/>
-              </a:solidFill>
-            </a:endParaRPr>
           </a:p>
         </p:txBody>
       </p:sp>

</xml_diff>